<commit_message>
Signed-off-by: Tianyu Gu <tg1553@nyu.edu>
</commit_message>
<xml_diff>
--- a/HW2/Q2.pptx
+++ b/HW2/Q2.pptx
@@ -5,10 +5,11 @@
     <p:sldMasterId id="2147483648" r:id="rId1"/>
   </p:sldMasterIdLst>
   <p:notesMasterIdLst>
-    <p:notesMasterId r:id="rId3"/>
+    <p:notesMasterId r:id="rId4"/>
   </p:notesMasterIdLst>
   <p:sldIdLst>
     <p:sldId id="404" r:id="rId2"/>
+    <p:sldId id="405" r:id="rId3"/>
   </p:sldIdLst>
   <p:sldSz cx="12192000" cy="6858000"/>
   <p:notesSz cx="6858000" cy="9144000"/>
@@ -3321,13 +3322,13 @@
           <p:nvPr>
             <p:extLst>
               <p:ext uri="{D42A27DB-BD31-4B8C-83A1-F6EECF244321}">
-                <p14:modId xmlns:p14="http://schemas.microsoft.com/office/powerpoint/2010/main" val="3046654766"/>
+                <p14:modId xmlns:p14="http://schemas.microsoft.com/office/powerpoint/2010/main" val="3122391172"/>
               </p:ext>
             </p:extLst>
           </p:nvPr>
         </p:nvGraphicFramePr>
         <p:xfrm>
-          <a:off x="2235782" y="1242307"/>
+          <a:off x="2203697" y="2629949"/>
           <a:ext cx="7629529" cy="1503426"/>
         </p:xfrm>
         <a:graphic>
@@ -4160,7 +4161,7 @@
         </p:nvSpPr>
         <p:spPr>
           <a:xfrm rot="3411890">
-            <a:off x="7478097" y="2004774"/>
+            <a:off x="7470075" y="3352311"/>
             <a:ext cx="645696" cy="356023"/>
           </a:xfrm>
           <a:prstGeom prst="rightArrow">
@@ -4203,23 +4204,83 @@
           </a:p>
         </p:txBody>
       </p:sp>
+      <p:sp>
+        <p:nvSpPr>
+          <p:cNvPr id="9" name="文本框 8"/>
+          <p:cNvSpPr txBox="1"/>
+          <p:nvPr/>
+        </p:nvSpPr>
+        <p:spPr>
+          <a:xfrm>
+            <a:off x="5047246" y="2137836"/>
+            <a:ext cx="2070769" cy="400110"/>
+          </a:xfrm>
+          <a:prstGeom prst="rect">
+            <a:avLst/>
+          </a:prstGeom>
+          <a:noFill/>
+        </p:spPr>
+        <p:txBody>
+          <a:bodyPr wrap="square" rtlCol="0">
+            <a:spAutoFit/>
+          </a:bodyPr>
+          <a:lstStyle/>
+          <a:p>
+            <a:r>
+              <a:rPr lang="en-US" altLang="zh-CN" sz="2000" dirty="0"/>
+              <a:t>EX-EX Forwarding</a:t>
+            </a:r>
+            <a:endParaRPr lang="zh-CN" altLang="en-US" sz="2000" dirty="0"/>
+          </a:p>
+        </p:txBody>
+      </p:sp>
+    </p:spTree>
+    <p:extLst>
+      <p:ext uri="{BB962C8B-B14F-4D97-AF65-F5344CB8AC3E}">
+        <p14:creationId xmlns:p14="http://schemas.microsoft.com/office/powerpoint/2010/main" val="4005867597"/>
+      </p:ext>
+    </p:extLst>
+  </p:cSld>
+  <p:clrMapOvr>
+    <a:masterClrMapping/>
+  </p:clrMapOvr>
+</p:sld>
+</file>
+
+<file path=ppt/slides/slide2.xml><?xml version="1.0" encoding="utf-8"?>
+<p:sld xmlns:a="http://schemas.openxmlformats.org/drawingml/2006/main" xmlns:r="http://schemas.openxmlformats.org/officeDocument/2006/relationships" xmlns:p="http://schemas.openxmlformats.org/presentationml/2006/main">
+  <p:cSld>
+    <p:spTree>
+      <p:nvGrpSpPr>
+        <p:cNvPr id="1" name=""/>
+        <p:cNvGrpSpPr/>
+        <p:nvPr/>
+      </p:nvGrpSpPr>
+      <p:grpSpPr>
+        <a:xfrm>
+          <a:off x="0" y="0"/>
+          <a:ext cx="0" cy="0"/>
+          <a:chOff x="0" y="0"/>
+          <a:chExt cx="0" cy="0"/>
+        </a:xfrm>
+      </p:grpSpPr>
       <p:graphicFrame>
         <p:nvGraphicFramePr>
-          <p:cNvPr id="3" name="表格 2"/>
+          <p:cNvPr id="4" name="表格 3"/>
           <p:cNvGraphicFramePr>
             <a:graphicFrameLocks noGrp="1"/>
           </p:cNvGraphicFramePr>
           <p:nvPr>
             <p:extLst>
               <p:ext uri="{D42A27DB-BD31-4B8C-83A1-F6EECF244321}">
-                <p14:modId xmlns:p14="http://schemas.microsoft.com/office/powerpoint/2010/main" val="1320294720"/>
+                <p14:modId xmlns:p14="http://schemas.microsoft.com/office/powerpoint/2010/main" val="3997534573"/>
               </p:ext>
             </p:extLst>
           </p:nvPr>
         </p:nvGraphicFramePr>
         <p:xfrm>
-          <a:off x="1892968" y="4232887"/>
-          <a:ext cx="8443496" cy="1587373"/>
+          <a:off x="1820779" y="2692845"/>
+          <a:ext cx="8443496" cy="1632712"/>
         </p:xfrm>
         <a:graphic>
           <a:graphicData uri="http://schemas.openxmlformats.org/drawingml/2006/table">
@@ -4235,49 +4296,49 @@
                     </a:ext>
                   </a:extLst>
                 </a:gridCol>
-                <a:gridCol w="835526">
+                <a:gridCol w="1042737">
                   <a:extLst>
                     <a:ext uri="{9D8B030D-6E8A-4147-A177-3AD203B41FA5}">
                       <a16:colId xmlns:a16="http://schemas.microsoft.com/office/drawing/2014/main" val="1008222192"/>
                     </a:ext>
                   </a:extLst>
                 </a:gridCol>
-                <a:gridCol w="1055437">
+                <a:gridCol w="994610">
                   <a:extLst>
                     <a:ext uri="{9D8B030D-6E8A-4147-A177-3AD203B41FA5}">
                       <a16:colId xmlns:a16="http://schemas.microsoft.com/office/drawing/2014/main" val="3861032815"/>
                     </a:ext>
                   </a:extLst>
                 </a:gridCol>
-                <a:gridCol w="1088766">
+                <a:gridCol w="1066800">
                   <a:extLst>
                     <a:ext uri="{9D8B030D-6E8A-4147-A177-3AD203B41FA5}">
                       <a16:colId xmlns:a16="http://schemas.microsoft.com/office/drawing/2014/main" val="336844387"/>
                     </a:ext>
                   </a:extLst>
                 </a:gridCol>
-                <a:gridCol w="1022108">
+                <a:gridCol w="1058779">
                   <a:extLst>
                     <a:ext uri="{9D8B030D-6E8A-4147-A177-3AD203B41FA5}">
                       <a16:colId xmlns:a16="http://schemas.microsoft.com/office/drawing/2014/main" val="1413889980"/>
                     </a:ext>
                   </a:extLst>
                 </a:gridCol>
-                <a:gridCol w="1055437">
+                <a:gridCol w="1018674">
                   <a:extLst>
                     <a:ext uri="{9D8B030D-6E8A-4147-A177-3AD203B41FA5}">
                       <a16:colId xmlns:a16="http://schemas.microsoft.com/office/drawing/2014/main" val="3629677843"/>
                     </a:ext>
                   </a:extLst>
                 </a:gridCol>
-                <a:gridCol w="1055437">
+                <a:gridCol w="1002631">
                   <a:extLst>
                     <a:ext uri="{9D8B030D-6E8A-4147-A177-3AD203B41FA5}">
                       <a16:colId xmlns:a16="http://schemas.microsoft.com/office/drawing/2014/main" val="2551319026"/>
                     </a:ext>
                   </a:extLst>
                 </a:gridCol>
-                <a:gridCol w="1055437">
+                <a:gridCol w="983917">
                   <a:extLst>
                     <a:ext uri="{9D8B030D-6E8A-4147-A177-3AD203B41FA5}">
                       <a16:colId xmlns:a16="http://schemas.microsoft.com/office/drawing/2014/main" val="2463636350"/>
@@ -4371,12 +4432,12 @@
                         </a:spcAft>
                       </a:pPr>
                       <a:r>
-                        <a:rPr lang="en-US" sz="1800">
+                        <a:rPr lang="en-US" sz="1800" dirty="0">
                           <a:effectLst/>
                         </a:rPr>
                         <a:t>2</a:t>
                       </a:r>
-                      <a:endParaRPr lang="en-US" sz="1800">
+                      <a:endParaRPr lang="en-US" sz="1800" dirty="0">
                         <a:solidFill>
                           <a:srgbClr val="000000"/>
                         </a:solidFill>
@@ -4807,7 +4868,7 @@
                           <a:spcPts val="0"/>
                         </a:spcAft>
                       </a:pPr>
-                      <a:endParaRPr lang="zh-CN" altLang="en-US" sz="1800" kern="1200">
+                      <a:endParaRPr lang="zh-CN" altLang="en-US" sz="1800" kern="1200" dirty="0">
                         <a:solidFill>
                           <a:schemeClr val="dk1"/>
                         </a:solidFill>
@@ -5123,13 +5184,13 @@
       </p:graphicFrame>
       <p:sp>
         <p:nvSpPr>
-          <p:cNvPr id="8" name="Right Arrow 4"/>
+          <p:cNvPr id="5" name="Right Arrow 4"/>
           <p:cNvSpPr/>
           <p:nvPr/>
         </p:nvSpPr>
         <p:spPr>
           <a:xfrm rot="3411890">
-            <a:off x="6868045" y="4974559"/>
+            <a:off x="6948255" y="3466601"/>
             <a:ext cx="645696" cy="356023"/>
           </a:xfrm>
           <a:prstGeom prst="rightArrow">
@@ -5174,14 +5235,14 @@
       </p:sp>
       <p:sp>
         <p:nvSpPr>
-          <p:cNvPr id="9" name="文本框 8"/>
+          <p:cNvPr id="6" name="文本框 5"/>
           <p:cNvSpPr txBox="1"/>
           <p:nvPr/>
         </p:nvSpPr>
         <p:spPr>
           <a:xfrm>
-            <a:off x="5061284" y="529389"/>
-            <a:ext cx="2791327" cy="369332"/>
+            <a:off x="4161226" y="2257389"/>
+            <a:ext cx="3762599" cy="400110"/>
           </a:xfrm>
           <a:prstGeom prst="rect">
             <a:avLst/>
@@ -5195,47 +5256,17 @@
           <a:lstStyle/>
           <a:p>
             <a:r>
-              <a:rPr lang="en-US" altLang="zh-CN" dirty="0"/>
-              <a:t>EX-EX Forwarding</a:t>
-            </a:r>
-            <a:endParaRPr lang="zh-CN" altLang="en-US" dirty="0"/>
-          </a:p>
-        </p:txBody>
-      </p:sp>
-      <p:sp>
-        <p:nvSpPr>
-          <p:cNvPr id="10" name="文本框 9"/>
-          <p:cNvSpPr txBox="1"/>
-          <p:nvPr/>
-        </p:nvSpPr>
-        <p:spPr>
-          <a:xfrm>
-            <a:off x="4475748" y="3587539"/>
-            <a:ext cx="3325198" cy="369332"/>
-          </a:xfrm>
-          <a:prstGeom prst="rect">
-            <a:avLst/>
-          </a:prstGeom>
-          <a:noFill/>
-        </p:spPr>
-        <p:txBody>
-          <a:bodyPr wrap="square" rtlCol="0">
-            <a:spAutoFit/>
-          </a:bodyPr>
-          <a:lstStyle/>
-          <a:p>
-            <a:r>
-              <a:rPr lang="en-US" altLang="zh-CN" dirty="0"/>
+              <a:rPr lang="en-US" altLang="zh-CN" sz="2000" dirty="0"/>
               <a:t>EX-Mem Forwarding (with stalling)</a:t>
             </a:r>
-            <a:endParaRPr lang="zh-CN" altLang="en-US" dirty="0"/>
+            <a:endParaRPr lang="zh-CN" altLang="en-US" sz="2000" dirty="0"/>
           </a:p>
         </p:txBody>
       </p:sp>
     </p:spTree>
     <p:extLst>
       <p:ext uri="{BB962C8B-B14F-4D97-AF65-F5344CB8AC3E}">
-        <p14:creationId xmlns:p14="http://schemas.microsoft.com/office/powerpoint/2010/main" val="4005867597"/>
+        <p14:creationId xmlns:p14="http://schemas.microsoft.com/office/powerpoint/2010/main" val="1623984159"/>
       </p:ext>
     </p:extLst>
   </p:cSld>

</xml_diff>